<commit_message>
Updated UI design ppt
</commit_message>
<xml_diff>
--- a/V0.1/Project Manual/UI design V0.1.pptx
+++ b/V0.1/Project Manual/UI design V0.1.pptx
@@ -5,7 +5,7 @@
     <p:sldMasterId id="2147483648" r:id="rId1"/>
   </p:sldMasterIdLst>
   <p:notesMasterIdLst>
-    <p:notesMasterId r:id="rId19"/>
+    <p:notesMasterId r:id="rId22"/>
   </p:notesMasterIdLst>
   <p:sldIdLst>
     <p:sldId id="257" r:id="rId2"/>
@@ -20,11 +20,14 @@
     <p:sldId id="269" r:id="rId11"/>
     <p:sldId id="270" r:id="rId12"/>
     <p:sldId id="271" r:id="rId13"/>
-    <p:sldId id="279" r:id="rId14"/>
-    <p:sldId id="284" r:id="rId15"/>
-    <p:sldId id="280" r:id="rId16"/>
-    <p:sldId id="285" r:id="rId17"/>
-    <p:sldId id="281" r:id="rId18"/>
+    <p:sldId id="287" r:id="rId14"/>
+    <p:sldId id="288" r:id="rId15"/>
+    <p:sldId id="279" r:id="rId16"/>
+    <p:sldId id="284" r:id="rId17"/>
+    <p:sldId id="280" r:id="rId18"/>
+    <p:sldId id="285" r:id="rId19"/>
+    <p:sldId id="281" r:id="rId20"/>
+    <p:sldId id="286" r:id="rId21"/>
   </p:sldIdLst>
   <p:sldSz cx="12192000" cy="6858000"/>
   <p:notesSz cx="6858000" cy="9144000"/>
@@ -213,7 +216,7 @@
           <a:p>
             <a:fld id="{A1A61528-2C18-4C0D-AB2B-26DCCA4302D7}" type="datetimeFigureOut">
               <a:rPr lang="en-SG" smtClean="0"/>
-              <a:t>13/3/2015</a:t>
+              <a:t>16/3/2015</a:t>
             </a:fld>
             <a:endParaRPr lang="en-SG"/>
           </a:p>
@@ -623,6 +626,23 @@
           <a:bodyPr/>
           <a:lstStyle/>
           <a:p>
+            <a:r>
+              <a:rPr lang="en-SG" dirty="0" smtClean="0"/>
+              <a:t>Simple move your mouse over to “HELP” and press</a:t>
+            </a:r>
+            <a:r>
+              <a:rPr lang="en-SG" baseline="0" dirty="0" smtClean="0"/>
+              <a:t> ‘Undo’</a:t>
+            </a:r>
+            <a:endParaRPr lang="en-SG" dirty="0" smtClean="0"/>
+          </a:p>
+          <a:p>
+            <a:r>
+              <a:rPr lang="en-SG" dirty="0" smtClean="0"/>
+              <a:t>Alternatively, you can also type undo on the command bar.</a:t>
+            </a:r>
+          </a:p>
+          <a:p>
             <a:endParaRPr lang="en-SG" dirty="0"/>
           </a:p>
         </p:txBody>
@@ -645,6 +665,90 @@
             <a:fld id="{D197FE06-7D4F-45EE-80A8-30F5570C1B21}" type="slidenum">
               <a:rPr lang="en-SG" smtClean="0"/>
               <a:t>15</a:t>
+            </a:fld>
+            <a:endParaRPr lang="en-SG"/>
+          </a:p>
+        </p:txBody>
+      </p:sp>
+    </p:spTree>
+    <p:extLst>
+      <p:ext uri="{BB962C8B-B14F-4D97-AF65-F5344CB8AC3E}">
+        <p14:creationId xmlns:p14="http://schemas.microsoft.com/office/powerpoint/2010/main" val="426108220"/>
+      </p:ext>
+    </p:extLst>
+  </p:cSld>
+  <p:clrMapOvr>
+    <a:masterClrMapping/>
+  </p:clrMapOvr>
+</p:notes>
+</file>
+
+<file path=ppt/notesSlides/notesSlide11.xml><?xml version="1.0" encoding="utf-8"?>
+<p:notes xmlns:a="http://schemas.openxmlformats.org/drawingml/2006/main" xmlns:r="http://schemas.openxmlformats.org/officeDocument/2006/relationships" xmlns:p="http://schemas.openxmlformats.org/presentationml/2006/main">
+  <p:cSld>
+    <p:spTree>
+      <p:nvGrpSpPr>
+        <p:cNvPr id="1" name=""/>
+        <p:cNvGrpSpPr/>
+        <p:nvPr/>
+      </p:nvGrpSpPr>
+      <p:grpSpPr>
+        <a:xfrm>
+          <a:off x="0" y="0"/>
+          <a:ext cx="0" cy="0"/>
+          <a:chOff x="0" y="0"/>
+          <a:chExt cx="0" cy="0"/>
+        </a:xfrm>
+      </p:grpSpPr>
+      <p:sp>
+        <p:nvSpPr>
+          <p:cNvPr id="2" name="Slide Image Placeholder 1"/>
+          <p:cNvSpPr>
+            <a:spLocks noGrp="1" noRot="1" noChangeAspect="1"/>
+          </p:cNvSpPr>
+          <p:nvPr>
+            <p:ph type="sldImg"/>
+          </p:nvPr>
+        </p:nvSpPr>
+        <p:spPr/>
+      </p:sp>
+      <p:sp>
+        <p:nvSpPr>
+          <p:cNvPr id="3" name="Notes Placeholder 2"/>
+          <p:cNvSpPr>
+            <a:spLocks noGrp="1"/>
+          </p:cNvSpPr>
+          <p:nvPr>
+            <p:ph type="body" idx="1"/>
+          </p:nvPr>
+        </p:nvSpPr>
+        <p:spPr/>
+        <p:txBody>
+          <a:bodyPr/>
+          <a:lstStyle/>
+          <a:p>
+            <a:endParaRPr lang="en-SG" dirty="0"/>
+          </a:p>
+        </p:txBody>
+      </p:sp>
+      <p:sp>
+        <p:nvSpPr>
+          <p:cNvPr id="4" name="Slide Number Placeholder 3"/>
+          <p:cNvSpPr>
+            <a:spLocks noGrp="1"/>
+          </p:cNvSpPr>
+          <p:nvPr>
+            <p:ph type="sldNum" sz="quarter" idx="10"/>
+          </p:nvPr>
+        </p:nvSpPr>
+        <p:spPr/>
+        <p:txBody>
+          <a:bodyPr/>
+          <a:lstStyle/>
+          <a:p>
+            <a:fld id="{D197FE06-7D4F-45EE-80A8-30F5570C1B21}" type="slidenum">
+              <a:rPr lang="en-SG" smtClean="0"/>
+              <a:t>17</a:t>
             </a:fld>
             <a:endParaRPr lang="en-SG"/>
           </a:p>
@@ -1301,11 +1405,7 @@
           <a:p>
             <a:r>
               <a:rPr lang="en-SG" dirty="0" smtClean="0"/>
-              <a:t>Simple move your mouse over to “SHOW” and press on the format you would like to </a:t>
-            </a:r>
-            <a:r>
-              <a:rPr lang="en-SG" dirty="0" smtClean="0"/>
-              <a:t>display.</a:t>
+              <a:t>Simple move your mouse over to “SHOW” and press on the format you would like to display.</a:t>
             </a:r>
           </a:p>
           <a:p>
@@ -1402,21 +1502,12 @@
           <a:p>
             <a:r>
               <a:rPr lang="en-SG" dirty="0" smtClean="0"/>
-              <a:t>Simple move your mouse over to “HELP” and press</a:t>
+              <a:t>Press the &lt;&lt; or &gt;&gt; buttons</a:t>
             </a:r>
             <a:r>
               <a:rPr lang="en-SG" baseline="0" dirty="0" smtClean="0"/>
-              <a:t> ‘Undo’</a:t>
+              <a:t> at the top of the UI.</a:t>
             </a:r>
-            <a:endParaRPr lang="en-SG" dirty="0" smtClean="0"/>
-          </a:p>
-          <a:p>
-            <a:r>
-              <a:rPr lang="en-SG" dirty="0" smtClean="0"/>
-              <a:t>Alternatively, you can also type undo on the command bar.</a:t>
-            </a:r>
-          </a:p>
-          <a:p>
             <a:endParaRPr lang="en-SG" dirty="0"/>
           </a:p>
         </p:txBody>
@@ -1447,7 +1538,7 @@
     </p:spTree>
     <p:extLst>
       <p:ext uri="{BB962C8B-B14F-4D97-AF65-F5344CB8AC3E}">
-        <p14:creationId xmlns:p14="http://schemas.microsoft.com/office/powerpoint/2010/main" val="426108220"/>
+        <p14:creationId xmlns:p14="http://schemas.microsoft.com/office/powerpoint/2010/main" val="3932005236"/>
       </p:ext>
     </p:extLst>
   </p:cSld>
@@ -1588,7 +1679,7 @@
           <a:p>
             <a:fld id="{140FA8FC-0791-4955-B24C-27954A8BABB2}" type="datetimeFigureOut">
               <a:rPr lang="en-SG" smtClean="0"/>
-              <a:t>13/3/2015</a:t>
+              <a:t>16/3/2015</a:t>
             </a:fld>
             <a:endParaRPr lang="en-SG"/>
           </a:p>
@@ -1758,7 +1849,7 @@
           <a:p>
             <a:fld id="{140FA8FC-0791-4955-B24C-27954A8BABB2}" type="datetimeFigureOut">
               <a:rPr lang="en-SG" smtClean="0"/>
-              <a:t>13/3/2015</a:t>
+              <a:t>16/3/2015</a:t>
             </a:fld>
             <a:endParaRPr lang="en-SG"/>
           </a:p>
@@ -1938,7 +2029,7 @@
           <a:p>
             <a:fld id="{140FA8FC-0791-4955-B24C-27954A8BABB2}" type="datetimeFigureOut">
               <a:rPr lang="en-SG" smtClean="0"/>
-              <a:t>13/3/2015</a:t>
+              <a:t>16/3/2015</a:t>
             </a:fld>
             <a:endParaRPr lang="en-SG"/>
           </a:p>
@@ -2108,7 +2199,7 @@
           <a:p>
             <a:fld id="{140FA8FC-0791-4955-B24C-27954A8BABB2}" type="datetimeFigureOut">
               <a:rPr lang="en-SG" smtClean="0"/>
-              <a:t>13/3/2015</a:t>
+              <a:t>16/3/2015</a:t>
             </a:fld>
             <a:endParaRPr lang="en-SG"/>
           </a:p>
@@ -2354,7 +2445,7 @@
           <a:p>
             <a:fld id="{140FA8FC-0791-4955-B24C-27954A8BABB2}" type="datetimeFigureOut">
               <a:rPr lang="en-SG" smtClean="0"/>
-              <a:t>13/3/2015</a:t>
+              <a:t>16/3/2015</a:t>
             </a:fld>
             <a:endParaRPr lang="en-SG"/>
           </a:p>
@@ -2586,7 +2677,7 @@
           <a:p>
             <a:fld id="{140FA8FC-0791-4955-B24C-27954A8BABB2}" type="datetimeFigureOut">
               <a:rPr lang="en-SG" smtClean="0"/>
-              <a:t>13/3/2015</a:t>
+              <a:t>16/3/2015</a:t>
             </a:fld>
             <a:endParaRPr lang="en-SG"/>
           </a:p>
@@ -2953,7 +3044,7 @@
           <a:p>
             <a:fld id="{140FA8FC-0791-4955-B24C-27954A8BABB2}" type="datetimeFigureOut">
               <a:rPr lang="en-SG" smtClean="0"/>
-              <a:t>13/3/2015</a:t>
+              <a:t>16/3/2015</a:t>
             </a:fld>
             <a:endParaRPr lang="en-SG"/>
           </a:p>
@@ -3071,7 +3162,7 @@
           <a:p>
             <a:fld id="{140FA8FC-0791-4955-B24C-27954A8BABB2}" type="datetimeFigureOut">
               <a:rPr lang="en-SG" smtClean="0"/>
-              <a:t>13/3/2015</a:t>
+              <a:t>16/3/2015</a:t>
             </a:fld>
             <a:endParaRPr lang="en-SG"/>
           </a:p>
@@ -3166,7 +3257,7 @@
           <a:p>
             <a:fld id="{140FA8FC-0791-4955-B24C-27954A8BABB2}" type="datetimeFigureOut">
               <a:rPr lang="en-SG" smtClean="0"/>
-              <a:t>13/3/2015</a:t>
+              <a:t>16/3/2015</a:t>
             </a:fld>
             <a:endParaRPr lang="en-SG"/>
           </a:p>
@@ -3443,7 +3534,7 @@
           <a:p>
             <a:fld id="{140FA8FC-0791-4955-B24C-27954A8BABB2}" type="datetimeFigureOut">
               <a:rPr lang="en-SG" smtClean="0"/>
-              <a:t>13/3/2015</a:t>
+              <a:t>16/3/2015</a:t>
             </a:fld>
             <a:endParaRPr lang="en-SG"/>
           </a:p>
@@ -3696,7 +3787,7 @@
           <a:p>
             <a:fld id="{140FA8FC-0791-4955-B24C-27954A8BABB2}" type="datetimeFigureOut">
               <a:rPr lang="en-SG" smtClean="0"/>
-              <a:t>13/3/2015</a:t>
+              <a:t>16/3/2015</a:t>
             </a:fld>
             <a:endParaRPr lang="en-SG"/>
           </a:p>
@@ -3909,7 +4000,7 @@
           <a:p>
             <a:fld id="{140FA8FC-0791-4955-B24C-27954A8BABB2}" type="datetimeFigureOut">
               <a:rPr lang="en-SG" smtClean="0"/>
-              <a:t>13/3/2015</a:t>
+              <a:t>16/3/2015</a:t>
             </a:fld>
             <a:endParaRPr lang="en-SG"/>
           </a:p>
@@ -5795,7 +5886,17 @@
                     </a:schemeClr>
                   </a:solidFill>
                 </a:rPr>
-                <a:t>            </a:t>
+                <a:t>              </a:t>
+              </a:r>
+              <a:r>
+                <a:rPr lang="en-SG" sz="1400" dirty="0">
+                  <a:solidFill>
+                    <a:schemeClr val="bg1">
+                      <a:lumMod val="50000"/>
+                    </a:schemeClr>
+                  </a:solidFill>
+                </a:rPr>
+                <a:t>S</a:t>
               </a:r>
               <a:r>
                 <a:rPr lang="en-SG" sz="1400" dirty="0" smtClean="0">
@@ -5805,51 +5906,18 @@
                     </a:schemeClr>
                   </a:solidFill>
                 </a:rPr>
-                <a:t>  </a:t>
-              </a:r>
-              <a:r>
-                <a:rPr lang="en-SG" sz="1400" dirty="0">
-                  <a:solidFill>
-                    <a:schemeClr val="bg1">
-                      <a:lumMod val="50000"/>
-                    </a:schemeClr>
-                  </a:solidFill>
-                </a:rPr>
-                <a:t>S</a:t>
-              </a:r>
+                <a:t>tarbucks</a:t>
+              </a:r>
+            </a:p>
+            <a:p>
               <a:r>
                 <a:rPr lang="en-SG" sz="1400" dirty="0" smtClean="0">
                   <a:solidFill>
-                    <a:schemeClr val="bg1">
-                      <a:lumMod val="50000"/>
-                    </a:schemeClr>
-                  </a:solidFill>
-                </a:rPr>
-                <a:t>tarbucks</a:t>
-              </a:r>
-            </a:p>
-            <a:p>
-              <a:r>
-                <a:rPr lang="en-SG" sz="1400" dirty="0" smtClean="0">
-                  <a:solidFill>
                     <a:srgbClr val="2007DD"/>
                   </a:solidFill>
                 </a:rPr>
-                <a:t>              </a:t>
-              </a:r>
-              <a:r>
-                <a:rPr lang="en-SG" sz="1400" dirty="0" smtClean="0">
-                  <a:solidFill>
-                    <a:srgbClr val="2007DD"/>
-                  </a:solidFill>
-                </a:rPr>
-                <a:t>Homework</a:t>
-              </a:r>
-              <a:endParaRPr lang="en-SG" sz="1400" dirty="0" smtClean="0">
-                <a:solidFill>
-                  <a:srgbClr val="2007DD"/>
-                </a:solidFill>
-              </a:endParaRPr>
+                <a:t>              Homework</a:t>
+              </a:r>
             </a:p>
           </p:txBody>
         </p:sp>
@@ -6264,44 +6332,6 @@
         </p:sp>
         <p:sp>
           <p:nvSpPr>
-            <p:cNvPr id="10" name="TextBox 2"/>
-            <p:cNvSpPr txBox="1"/>
-            <p:nvPr/>
-          </p:nvSpPr>
-          <p:spPr>
-            <a:xfrm>
-              <a:off x="4116818" y="4491145"/>
-              <a:ext cx="4082603" cy="276999"/>
-            </a:xfrm>
-            <a:prstGeom prst="rect">
-              <a:avLst/>
-            </a:prstGeom>
-            <a:noFill/>
-          </p:spPr>
-          <p:txBody>
-            <a:bodyPr wrap="square" rtlCol="0">
-              <a:spAutoFit/>
-            </a:bodyPr>
-            <a:lstStyle/>
-            <a:p>
-              <a:r>
-                <a:rPr lang="en-SG" sz="1200" dirty="0" smtClean="0">
-                  <a:solidFill>
-                    <a:schemeClr val="bg1"/>
-                  </a:solidFill>
-                </a:rPr>
-                <a:t>Please type in the command box below</a:t>
-              </a:r>
-              <a:endParaRPr lang="en-SG" sz="1200" dirty="0">
-                <a:solidFill>
-                  <a:schemeClr val="bg1"/>
-                </a:solidFill>
-              </a:endParaRPr>
-            </a:p>
-          </p:txBody>
-        </p:sp>
-        <p:sp>
-          <p:nvSpPr>
             <p:cNvPr id="11" name="TextBox 10"/>
             <p:cNvSpPr txBox="1"/>
             <p:nvPr/>
@@ -6442,6 +6472,59 @@
           </p:txBody>
         </p:sp>
       </p:grpSp>
+      <p:sp>
+        <p:nvSpPr>
+          <p:cNvPr id="13" name="TextBox 12"/>
+          <p:cNvSpPr txBox="1"/>
+          <p:nvPr/>
+        </p:nvSpPr>
+        <p:spPr>
+          <a:xfrm>
+            <a:off x="4478187" y="5426848"/>
+            <a:ext cx="1442292" cy="646331"/>
+          </a:xfrm>
+          <a:prstGeom prst="rect">
+            <a:avLst/>
+          </a:prstGeom>
+          <a:noFill/>
+          <a:ln>
+            <a:noFill/>
+          </a:ln>
+        </p:spPr>
+        <p:txBody>
+          <a:bodyPr wrap="square" rtlCol="0">
+            <a:spAutoFit/>
+          </a:bodyPr>
+          <a:lstStyle/>
+          <a:p>
+            <a:r>
+              <a:rPr lang="en-SG" sz="1200" dirty="0" smtClean="0"/>
+              <a:t>School </a:t>
+            </a:r>
+            <a:r>
+              <a:rPr lang="en-SG" sz="1200" dirty="0" smtClean="0"/>
+              <a:t>displayed</a:t>
+            </a:r>
+          </a:p>
+          <a:p>
+            <a:r>
+              <a:rPr lang="en-SG" sz="1200" dirty="0" smtClean="0"/>
+              <a:t>CS2103 finals </a:t>
+            </a:r>
+            <a:r>
+              <a:rPr lang="en-SG" sz="1200" dirty="0" smtClean="0"/>
+              <a:t>edited</a:t>
+            </a:r>
+          </a:p>
+          <a:p>
+            <a:r>
+              <a:rPr lang="en-SG" sz="1200" dirty="0" smtClean="0"/>
+              <a:t>Day displayed</a:t>
+            </a:r>
+            <a:endParaRPr lang="en-SG" sz="1200" dirty="0" smtClean="0"/>
+          </a:p>
+        </p:txBody>
+      </p:sp>
     </p:spTree>
     <p:extLst>
       <p:ext uri="{BB962C8B-B14F-4D97-AF65-F5344CB8AC3E}">
@@ -6456,6 +6539,853 @@
 </file>
 
 <file path=ppt/slides/slide13.xml><?xml version="1.0" encoding="utf-8"?>
+<p:sld xmlns:a="http://schemas.openxmlformats.org/drawingml/2006/main" xmlns:r="http://schemas.openxmlformats.org/officeDocument/2006/relationships" xmlns:p="http://schemas.openxmlformats.org/presentationml/2006/main">
+  <p:cSld>
+    <p:spTree>
+      <p:nvGrpSpPr>
+        <p:cNvPr id="1" name=""/>
+        <p:cNvGrpSpPr/>
+        <p:nvPr/>
+      </p:nvGrpSpPr>
+      <p:grpSpPr>
+        <a:xfrm>
+          <a:off x="0" y="0"/>
+          <a:ext cx="0" cy="0"/>
+          <a:chOff x="0" y="0"/>
+          <a:chExt cx="0" cy="0"/>
+        </a:xfrm>
+      </p:grpSpPr>
+      <p:sp>
+        <p:nvSpPr>
+          <p:cNvPr id="4" name="TextBox 3"/>
+          <p:cNvSpPr txBox="1"/>
+          <p:nvPr/>
+        </p:nvSpPr>
+        <p:spPr>
+          <a:xfrm>
+            <a:off x="166255" y="436418"/>
+            <a:ext cx="1600552" cy="923330"/>
+          </a:xfrm>
+          <a:prstGeom prst="rect">
+            <a:avLst/>
+          </a:prstGeom>
+          <a:noFill/>
+        </p:spPr>
+        <p:txBody>
+          <a:bodyPr wrap="square" rtlCol="0">
+            <a:spAutoFit/>
+          </a:bodyPr>
+          <a:lstStyle/>
+          <a:p>
+            <a:r>
+              <a:rPr lang="en-SG" dirty="0" smtClean="0"/>
+              <a:t>Scrolling through displays</a:t>
+            </a:r>
+            <a:endParaRPr lang="en-SG" dirty="0"/>
+          </a:p>
+        </p:txBody>
+      </p:sp>
+      <p:grpSp>
+        <p:nvGrpSpPr>
+          <p:cNvPr id="5" name="Group 1"/>
+          <p:cNvGrpSpPr/>
+          <p:nvPr/>
+        </p:nvGrpSpPr>
+        <p:grpSpPr>
+          <a:xfrm>
+            <a:off x="2057401" y="159212"/>
+            <a:ext cx="8340388" cy="6270617"/>
+            <a:chOff x="2057401" y="159212"/>
+            <a:chExt cx="8340388" cy="6270617"/>
+          </a:xfrm>
+        </p:grpSpPr>
+        <p:pic>
+          <p:nvPicPr>
+            <p:cNvPr id="6" name="Picture 1"/>
+            <p:cNvPicPr>
+              <a:picLocks noChangeAspect="1"/>
+            </p:cNvPicPr>
+            <p:nvPr/>
+          </p:nvPicPr>
+          <p:blipFill>
+            <a:blip r:embed="rId3">
+              <a:extLst>
+                <a:ext uri="{28A0092B-C50C-407E-A947-70E740481C1C}">
+                  <a14:useLocalDpi xmlns:a14="http://schemas.microsoft.com/office/drawing/2010/main" val="0"/>
+                </a:ext>
+              </a:extLst>
+            </a:blip>
+            <a:stretch>
+              <a:fillRect/>
+            </a:stretch>
+          </p:blipFill>
+          <p:spPr>
+            <a:xfrm>
+              <a:off x="2057401" y="159212"/>
+              <a:ext cx="8340388" cy="6270617"/>
+            </a:xfrm>
+            <a:prstGeom prst="rect">
+              <a:avLst/>
+            </a:prstGeom>
+          </p:spPr>
+        </p:pic>
+        <p:sp>
+          <p:nvSpPr>
+            <p:cNvPr id="7" name="TextBox 4"/>
+            <p:cNvSpPr txBox="1"/>
+            <p:nvPr/>
+          </p:nvSpPr>
+          <p:spPr>
+            <a:xfrm>
+              <a:off x="4240350" y="1024234"/>
+              <a:ext cx="5529942" cy="523220"/>
+            </a:xfrm>
+            <a:prstGeom prst="rect">
+              <a:avLst/>
+            </a:prstGeom>
+            <a:noFill/>
+          </p:spPr>
+          <p:txBody>
+            <a:bodyPr wrap="square" rtlCol="0">
+              <a:spAutoFit/>
+            </a:bodyPr>
+            <a:lstStyle/>
+            <a:p>
+              <a:r>
+                <a:rPr lang="en-SG" sz="1400" dirty="0" smtClean="0">
+                  <a:solidFill>
+                    <a:schemeClr val="bg1">
+                      <a:lumMod val="50000"/>
+                    </a:schemeClr>
+                  </a:solidFill>
+                </a:rPr>
+                <a:t>4.     [12:30pm-1.30pm]</a:t>
+              </a:r>
+              <a:r>
+                <a:rPr lang="en-SG" sz="1400" dirty="0">
+                  <a:solidFill>
+                    <a:schemeClr val="bg1">
+                      <a:lumMod val="50000"/>
+                    </a:schemeClr>
+                  </a:solidFill>
+                </a:rPr>
+                <a:t>	</a:t>
+              </a:r>
+              <a:r>
+                <a:rPr lang="en-SG" sz="1400" dirty="0" smtClean="0">
+                  <a:solidFill>
+                    <a:schemeClr val="bg1">
+                      <a:lumMod val="50000"/>
+                    </a:schemeClr>
+                  </a:solidFill>
+                </a:rPr>
+                <a:t>Lunch with John </a:t>
+              </a:r>
+              <a:r>
+                <a:rPr lang="en-SG" sz="1400" dirty="0" smtClean="0"/>
+                <a:t>		                     </a:t>
+              </a:r>
+            </a:p>
+            <a:p>
+              <a:r>
+                <a:rPr lang="en-SG" sz="1400" dirty="0" smtClean="0">
+                  <a:solidFill>
+                    <a:srgbClr val="2007DD"/>
+                  </a:solidFill>
+                </a:rPr>
+                <a:t>5.     [2pm-5pm]	2103 Lecture	</a:t>
+              </a:r>
+              <a:r>
+                <a:rPr lang="en-SG" sz="1400" dirty="0">
+                  <a:solidFill>
+                    <a:srgbClr val="2007DD"/>
+                  </a:solidFill>
+                </a:rPr>
+                <a:t> </a:t>
+              </a:r>
+              <a:r>
+                <a:rPr lang="en-SG" sz="1400" dirty="0" smtClean="0">
+                  <a:solidFill>
+                    <a:srgbClr val="2007DD"/>
+                  </a:solidFill>
+                </a:rPr>
+                <a:t>                    #School</a:t>
+              </a:r>
+              <a:endParaRPr lang="en-SG" sz="1400" dirty="0">
+                <a:solidFill>
+                  <a:srgbClr val="2007DD"/>
+                </a:solidFill>
+              </a:endParaRPr>
+            </a:p>
+          </p:txBody>
+        </p:sp>
+        <p:sp>
+          <p:nvSpPr>
+            <p:cNvPr id="8" name="TextBox 7"/>
+            <p:cNvSpPr txBox="1"/>
+            <p:nvPr/>
+          </p:nvSpPr>
+          <p:spPr>
+            <a:xfrm>
+              <a:off x="2430676" y="5272961"/>
+              <a:ext cx="1909095" cy="954107"/>
+            </a:xfrm>
+            <a:prstGeom prst="rect">
+              <a:avLst/>
+            </a:prstGeom>
+            <a:noFill/>
+            <a:ln>
+              <a:noFill/>
+            </a:ln>
+          </p:spPr>
+          <p:txBody>
+            <a:bodyPr wrap="square" rtlCol="0">
+              <a:spAutoFit/>
+            </a:bodyPr>
+            <a:lstStyle/>
+            <a:p>
+              <a:r>
+                <a:rPr lang="en-SG" sz="1400" dirty="0" smtClean="0"/>
+                <a:t>School</a:t>
+              </a:r>
+            </a:p>
+            <a:p>
+              <a:r>
+                <a:rPr lang="en-SG" sz="1400" dirty="0" smtClean="0"/>
+                <a:t>Work</a:t>
+              </a:r>
+              <a:endParaRPr lang="en-SG" sz="1400" dirty="0"/>
+            </a:p>
+            <a:p>
+              <a:r>
+                <a:rPr lang="en-SG" sz="1400" dirty="0" smtClean="0"/>
+                <a:t>Food</a:t>
+              </a:r>
+            </a:p>
+            <a:p>
+              <a:endParaRPr lang="en-SG" sz="1400" dirty="0"/>
+            </a:p>
+          </p:txBody>
+        </p:sp>
+        <p:sp>
+          <p:nvSpPr>
+            <p:cNvPr id="9" name="TextBox 8"/>
+            <p:cNvSpPr txBox="1"/>
+            <p:nvPr/>
+          </p:nvSpPr>
+          <p:spPr>
+            <a:xfrm>
+              <a:off x="2184262" y="1499975"/>
+              <a:ext cx="1578636" cy="738664"/>
+            </a:xfrm>
+            <a:prstGeom prst="rect">
+              <a:avLst/>
+            </a:prstGeom>
+            <a:noFill/>
+          </p:spPr>
+          <p:txBody>
+            <a:bodyPr wrap="square" rtlCol="0">
+              <a:spAutoFit/>
+            </a:bodyPr>
+            <a:lstStyle/>
+            <a:p>
+              <a:pPr marL="342900" indent="-342900">
+                <a:buAutoNum type="arabicPeriod"/>
+              </a:pPr>
+              <a:r>
+                <a:rPr lang="en-SG" sz="1400" dirty="0" smtClean="0">
+                  <a:solidFill>
+                    <a:schemeClr val="bg1">
+                      <a:lumMod val="50000"/>
+                    </a:schemeClr>
+                  </a:solidFill>
+                </a:rPr>
+                <a:t>Buy </a:t>
+              </a:r>
+              <a:r>
+                <a:rPr lang="en-SG" sz="1400" dirty="0">
+                  <a:solidFill>
+                    <a:schemeClr val="bg1">
+                      <a:lumMod val="50000"/>
+                    </a:schemeClr>
+                  </a:solidFill>
+                </a:rPr>
+                <a:t>S</a:t>
+              </a:r>
+              <a:r>
+                <a:rPr lang="en-SG" sz="1400" dirty="0" smtClean="0">
+                  <a:solidFill>
+                    <a:schemeClr val="bg1">
+                      <a:lumMod val="50000"/>
+                    </a:schemeClr>
+                  </a:solidFill>
+                </a:rPr>
+                <a:t>tarbucks</a:t>
+              </a:r>
+            </a:p>
+            <a:p>
+              <a:pPr marL="342900" indent="-342900">
+                <a:buAutoNum type="arabicPeriod"/>
+              </a:pPr>
+              <a:r>
+                <a:rPr lang="en-SG" sz="1400" dirty="0" smtClean="0">
+                  <a:solidFill>
+                    <a:srgbClr val="2007DD"/>
+                  </a:solidFill>
+                </a:rPr>
+                <a:t>Do Homework</a:t>
+              </a:r>
+            </a:p>
+            <a:p>
+              <a:pPr marL="342900" indent="-342900">
+                <a:buAutoNum type="arabicPeriod"/>
+              </a:pPr>
+              <a:r>
+                <a:rPr lang="en-SG" sz="1400" dirty="0" smtClean="0">
+                  <a:solidFill>
+                    <a:schemeClr val="bg1">
+                      <a:lumMod val="50000"/>
+                    </a:schemeClr>
+                  </a:solidFill>
+                </a:rPr>
+                <a:t>Sleep</a:t>
+              </a:r>
+              <a:endParaRPr lang="en-SG" sz="1400" dirty="0">
+                <a:solidFill>
+                  <a:schemeClr val="bg1">
+                    <a:lumMod val="50000"/>
+                  </a:schemeClr>
+                </a:solidFill>
+              </a:endParaRPr>
+            </a:p>
+          </p:txBody>
+        </p:sp>
+      </p:grpSp>
+      <p:sp>
+        <p:nvSpPr>
+          <p:cNvPr id="10" name="TextBox 12"/>
+          <p:cNvSpPr txBox="1"/>
+          <p:nvPr/>
+        </p:nvSpPr>
+        <p:spPr>
+          <a:xfrm>
+            <a:off x="4478187" y="5426848"/>
+            <a:ext cx="1442292" cy="646331"/>
+          </a:xfrm>
+          <a:prstGeom prst="rect">
+            <a:avLst/>
+          </a:prstGeom>
+          <a:noFill/>
+          <a:ln>
+            <a:noFill/>
+          </a:ln>
+        </p:spPr>
+        <p:txBody>
+          <a:bodyPr wrap="square" rtlCol="0">
+            <a:spAutoFit/>
+          </a:bodyPr>
+          <a:lstStyle/>
+          <a:p>
+            <a:r>
+              <a:rPr lang="en-SG" sz="1200" dirty="0" smtClean="0"/>
+              <a:t>School </a:t>
+            </a:r>
+            <a:r>
+              <a:rPr lang="en-SG" sz="1200" dirty="0" smtClean="0"/>
+              <a:t>displayed</a:t>
+            </a:r>
+          </a:p>
+          <a:p>
+            <a:r>
+              <a:rPr lang="en-SG" sz="1200" dirty="0" smtClean="0"/>
+              <a:t>CS2103 finals </a:t>
+            </a:r>
+            <a:r>
+              <a:rPr lang="en-SG" sz="1200" dirty="0" smtClean="0"/>
+              <a:t>edited</a:t>
+            </a:r>
+          </a:p>
+          <a:p>
+            <a:r>
+              <a:rPr lang="en-SG" sz="1200" dirty="0" smtClean="0"/>
+              <a:t>Day displayed</a:t>
+            </a:r>
+            <a:endParaRPr lang="en-SG" sz="1200" dirty="0" smtClean="0"/>
+          </a:p>
+        </p:txBody>
+      </p:sp>
+    </p:spTree>
+    <p:extLst>
+      <p:ext uri="{BB962C8B-B14F-4D97-AF65-F5344CB8AC3E}">
+        <p14:creationId xmlns:p14="http://schemas.microsoft.com/office/powerpoint/2010/main" val="2936512814"/>
+      </p:ext>
+    </p:extLst>
+  </p:cSld>
+  <p:clrMapOvr>
+    <a:masterClrMapping/>
+  </p:clrMapOvr>
+</p:sld>
+</file>
+
+<file path=ppt/slides/slide14.xml><?xml version="1.0" encoding="utf-8"?>
+<p:sld xmlns:a="http://schemas.openxmlformats.org/drawingml/2006/main" xmlns:r="http://schemas.openxmlformats.org/officeDocument/2006/relationships" xmlns:p="http://schemas.openxmlformats.org/presentationml/2006/main">
+  <p:cSld>
+    <p:spTree>
+      <p:nvGrpSpPr>
+        <p:cNvPr id="1" name=""/>
+        <p:cNvGrpSpPr/>
+        <p:nvPr/>
+      </p:nvGrpSpPr>
+      <p:grpSpPr>
+        <a:xfrm>
+          <a:off x="0" y="0"/>
+          <a:ext cx="0" cy="0"/>
+          <a:chOff x="0" y="0"/>
+          <a:chExt cx="0" cy="0"/>
+        </a:xfrm>
+      </p:grpSpPr>
+      <p:sp>
+        <p:nvSpPr>
+          <p:cNvPr id="9" name="TextBox 12"/>
+          <p:cNvSpPr txBox="1"/>
+          <p:nvPr/>
+        </p:nvSpPr>
+        <p:spPr>
+          <a:xfrm>
+            <a:off x="4478187" y="5426848"/>
+            <a:ext cx="1442292" cy="646331"/>
+          </a:xfrm>
+          <a:prstGeom prst="rect">
+            <a:avLst/>
+          </a:prstGeom>
+          <a:noFill/>
+          <a:ln>
+            <a:noFill/>
+          </a:ln>
+        </p:spPr>
+        <p:txBody>
+          <a:bodyPr wrap="square" rtlCol="0">
+            <a:spAutoFit/>
+          </a:bodyPr>
+          <a:lstStyle/>
+          <a:p>
+            <a:r>
+              <a:rPr lang="en-SG" sz="1200" dirty="0" smtClean="0"/>
+              <a:t>School </a:t>
+            </a:r>
+            <a:r>
+              <a:rPr lang="en-SG" sz="1200" dirty="0" smtClean="0"/>
+              <a:t>displayed</a:t>
+            </a:r>
+          </a:p>
+          <a:p>
+            <a:r>
+              <a:rPr lang="en-SG" sz="1200" dirty="0" smtClean="0"/>
+              <a:t>CS2103 finals </a:t>
+            </a:r>
+            <a:r>
+              <a:rPr lang="en-SG" sz="1200" dirty="0" smtClean="0"/>
+              <a:t>edited</a:t>
+            </a:r>
+          </a:p>
+          <a:p>
+            <a:r>
+              <a:rPr lang="en-SG" sz="1200" dirty="0" smtClean="0"/>
+              <a:t>Day displayed</a:t>
+            </a:r>
+            <a:endParaRPr lang="en-SG" sz="1200" dirty="0" smtClean="0"/>
+          </a:p>
+        </p:txBody>
+      </p:sp>
+      <p:grpSp>
+        <p:nvGrpSpPr>
+          <p:cNvPr id="10" name="Group 1"/>
+          <p:cNvGrpSpPr/>
+          <p:nvPr/>
+        </p:nvGrpSpPr>
+        <p:grpSpPr>
+          <a:xfrm>
+            <a:off x="1801619" y="278969"/>
+            <a:ext cx="8237719" cy="6380911"/>
+            <a:chOff x="1974533" y="109537"/>
+            <a:chExt cx="8237719" cy="6550343"/>
+          </a:xfrm>
+        </p:grpSpPr>
+        <p:pic>
+          <p:nvPicPr>
+            <p:cNvPr id="11" name="Picture 10"/>
+            <p:cNvPicPr>
+              <a:picLocks noChangeAspect="1"/>
+            </p:cNvPicPr>
+            <p:nvPr/>
+          </p:nvPicPr>
+          <p:blipFill>
+            <a:blip r:embed="rId2"/>
+            <a:stretch>
+              <a:fillRect/>
+            </a:stretch>
+          </p:blipFill>
+          <p:spPr>
+            <a:xfrm>
+              <a:off x="1974533" y="109537"/>
+              <a:ext cx="8237719" cy="6550343"/>
+            </a:xfrm>
+            <a:prstGeom prst="rect">
+              <a:avLst/>
+            </a:prstGeom>
+          </p:spPr>
+        </p:pic>
+        <p:sp>
+          <p:nvSpPr>
+            <p:cNvPr id="12" name="TextBox 8"/>
+            <p:cNvSpPr txBox="1"/>
+            <p:nvPr/>
+          </p:nvSpPr>
+          <p:spPr>
+            <a:xfrm>
+              <a:off x="2065972" y="1499975"/>
+              <a:ext cx="1578636" cy="738664"/>
+            </a:xfrm>
+            <a:prstGeom prst="rect">
+              <a:avLst/>
+            </a:prstGeom>
+            <a:noFill/>
+          </p:spPr>
+          <p:txBody>
+            <a:bodyPr wrap="square" rtlCol="0">
+              <a:spAutoFit/>
+            </a:bodyPr>
+            <a:lstStyle/>
+            <a:p>
+              <a:pPr marL="342900" indent="-342900">
+                <a:buAutoNum type="arabicPeriod"/>
+              </a:pPr>
+              <a:r>
+                <a:rPr lang="en-SG" sz="1400" dirty="0" smtClean="0">
+                  <a:solidFill>
+                    <a:schemeClr val="bg1">
+                      <a:lumMod val="50000"/>
+                    </a:schemeClr>
+                  </a:solidFill>
+                </a:rPr>
+                <a:t>Buy </a:t>
+              </a:r>
+              <a:r>
+                <a:rPr lang="en-SG" sz="1400" dirty="0">
+                  <a:solidFill>
+                    <a:schemeClr val="bg1">
+                      <a:lumMod val="50000"/>
+                    </a:schemeClr>
+                  </a:solidFill>
+                </a:rPr>
+                <a:t>S</a:t>
+              </a:r>
+              <a:r>
+                <a:rPr lang="en-SG" sz="1400" dirty="0" smtClean="0">
+                  <a:solidFill>
+                    <a:schemeClr val="bg1">
+                      <a:lumMod val="50000"/>
+                    </a:schemeClr>
+                  </a:solidFill>
+                </a:rPr>
+                <a:t>tarbucks</a:t>
+              </a:r>
+            </a:p>
+            <a:p>
+              <a:pPr marL="342900" indent="-342900">
+                <a:buAutoNum type="arabicPeriod"/>
+              </a:pPr>
+              <a:r>
+                <a:rPr lang="en-SG" sz="1400" dirty="0" smtClean="0">
+                  <a:solidFill>
+                    <a:srgbClr val="2007DD"/>
+                  </a:solidFill>
+                </a:rPr>
+                <a:t>Do Homework</a:t>
+              </a:r>
+            </a:p>
+            <a:p>
+              <a:pPr marL="342900" indent="-342900">
+                <a:buAutoNum type="arabicPeriod"/>
+              </a:pPr>
+              <a:r>
+                <a:rPr lang="en-SG" sz="1400" dirty="0" smtClean="0">
+                  <a:solidFill>
+                    <a:schemeClr val="bg1">
+                      <a:lumMod val="50000"/>
+                    </a:schemeClr>
+                  </a:solidFill>
+                </a:rPr>
+                <a:t>Sleep</a:t>
+              </a:r>
+              <a:endParaRPr lang="en-SG" sz="1400" dirty="0">
+                <a:solidFill>
+                  <a:schemeClr val="bg1">
+                    <a:lumMod val="50000"/>
+                  </a:schemeClr>
+                </a:solidFill>
+              </a:endParaRPr>
+            </a:p>
+          </p:txBody>
+        </p:sp>
+        <p:sp>
+          <p:nvSpPr>
+            <p:cNvPr id="13" name="TextBox 10"/>
+            <p:cNvSpPr txBox="1"/>
+            <p:nvPr/>
+          </p:nvSpPr>
+          <p:spPr>
+            <a:xfrm>
+              <a:off x="2141116" y="5425361"/>
+              <a:ext cx="1909095" cy="954107"/>
+            </a:xfrm>
+            <a:prstGeom prst="rect">
+              <a:avLst/>
+            </a:prstGeom>
+            <a:noFill/>
+            <a:ln>
+              <a:noFill/>
+            </a:ln>
+          </p:spPr>
+          <p:txBody>
+            <a:bodyPr wrap="square" rtlCol="0">
+              <a:spAutoFit/>
+            </a:bodyPr>
+            <a:lstStyle/>
+            <a:p>
+              <a:r>
+                <a:rPr lang="en-SG" sz="1400" dirty="0" smtClean="0"/>
+                <a:t>School</a:t>
+              </a:r>
+            </a:p>
+            <a:p>
+              <a:r>
+                <a:rPr lang="en-SG" sz="1400" dirty="0" smtClean="0"/>
+                <a:t>Work</a:t>
+              </a:r>
+              <a:endParaRPr lang="en-SG" sz="1400" dirty="0"/>
+            </a:p>
+            <a:p>
+              <a:r>
+                <a:rPr lang="en-SG" sz="1400" dirty="0" smtClean="0"/>
+                <a:t>Food</a:t>
+              </a:r>
+            </a:p>
+            <a:p>
+              <a:endParaRPr lang="en-SG" sz="1400" dirty="0"/>
+            </a:p>
+          </p:txBody>
+        </p:sp>
+        <p:sp>
+          <p:nvSpPr>
+            <p:cNvPr id="14" name="TextBox 13"/>
+            <p:cNvSpPr txBox="1"/>
+            <p:nvPr/>
+          </p:nvSpPr>
+          <p:spPr>
+            <a:xfrm>
+              <a:off x="2004238" y="435425"/>
+              <a:ext cx="2094548" cy="307777"/>
+            </a:xfrm>
+            <a:prstGeom prst="rect">
+              <a:avLst/>
+            </a:prstGeom>
+            <a:noFill/>
+          </p:spPr>
+          <p:txBody>
+            <a:bodyPr wrap="square" rtlCol="0">
+              <a:spAutoFit/>
+            </a:bodyPr>
+            <a:lstStyle/>
+            <a:p>
+              <a:r>
+                <a:rPr lang="en-SG" sz="1400" b="1" dirty="0" smtClean="0"/>
+                <a:t>14 March 2015, Saturday</a:t>
+              </a:r>
+              <a:endParaRPr lang="en-SG" sz="1400" b="1" dirty="0"/>
+            </a:p>
+          </p:txBody>
+        </p:sp>
+        <p:sp>
+          <p:nvSpPr>
+            <p:cNvPr id="15" name="TextBox 4"/>
+            <p:cNvSpPr txBox="1"/>
+            <p:nvPr/>
+          </p:nvSpPr>
+          <p:spPr>
+            <a:xfrm>
+              <a:off x="4145280" y="993754"/>
+              <a:ext cx="5945052" cy="537113"/>
+            </a:xfrm>
+            <a:prstGeom prst="rect">
+              <a:avLst/>
+            </a:prstGeom>
+            <a:noFill/>
+          </p:spPr>
+          <p:txBody>
+            <a:bodyPr wrap="square" rtlCol="0">
+              <a:spAutoFit/>
+            </a:bodyPr>
+            <a:lstStyle/>
+            <a:p>
+              <a:r>
+                <a:rPr lang="en-SG" sz="1400" dirty="0" smtClean="0">
+                  <a:solidFill>
+                    <a:srgbClr val="00B050"/>
+                  </a:solidFill>
+                </a:rPr>
+                <a:t>4.     </a:t>
+              </a:r>
+              <a:r>
+                <a:rPr lang="en-SG" sz="1400" dirty="0" smtClean="0">
+                  <a:solidFill>
+                    <a:srgbClr val="00B050"/>
+                  </a:solidFill>
+                </a:rPr>
+                <a:t>[12pm-2pm]</a:t>
+              </a:r>
+              <a:r>
+                <a:rPr lang="en-SG" sz="1400" dirty="0">
+                  <a:solidFill>
+                    <a:srgbClr val="00B050"/>
+                  </a:solidFill>
+                </a:rPr>
+                <a:t>	</a:t>
+              </a:r>
+              <a:r>
+                <a:rPr lang="en-SG" sz="1400" dirty="0" smtClean="0">
+                  <a:solidFill>
+                    <a:srgbClr val="00B050"/>
+                  </a:solidFill>
+                </a:rPr>
+                <a:t>Lunch with family</a:t>
+              </a:r>
+              <a:endParaRPr lang="en-SG" sz="1400" dirty="0" smtClean="0">
+                <a:solidFill>
+                  <a:srgbClr val="00B050"/>
+                </a:solidFill>
+              </a:endParaRPr>
+            </a:p>
+            <a:p>
+              <a:pPr marL="342900" indent="-342900">
+                <a:buAutoNum type="arabicPeriod" startAt="5"/>
+              </a:pPr>
+              <a:r>
+                <a:rPr lang="en-SG" sz="1400" dirty="0" smtClean="0">
+                  <a:solidFill>
+                    <a:srgbClr val="2007DD"/>
+                  </a:solidFill>
+                </a:rPr>
+                <a:t>[9pm – 11pm]</a:t>
+              </a:r>
+              <a:r>
+                <a:rPr lang="en-SG" sz="1400" dirty="0" smtClean="0">
+                  <a:solidFill>
+                    <a:srgbClr val="2007DD"/>
+                  </a:solidFill>
+                </a:rPr>
+                <a:t>	</a:t>
+              </a:r>
+              <a:r>
+                <a:rPr lang="en-SG" sz="1400" dirty="0" smtClean="0">
+                  <a:solidFill>
+                    <a:srgbClr val="2007DD"/>
+                  </a:solidFill>
+                </a:rPr>
+                <a:t>John </a:t>
+              </a:r>
+              <a:r>
+                <a:rPr lang="en-SG" sz="1400" dirty="0" err="1" smtClean="0">
+                  <a:solidFill>
+                    <a:srgbClr val="2007DD"/>
+                  </a:solidFill>
+                </a:rPr>
+                <a:t>bday</a:t>
+              </a:r>
+              <a:r>
+                <a:rPr lang="en-SG" sz="1400" dirty="0" smtClean="0">
+                  <a:solidFill>
+                    <a:srgbClr val="2007DD"/>
+                  </a:solidFill>
+                </a:rPr>
+                <a:t> party</a:t>
+              </a:r>
+              <a:endParaRPr lang="en-SG" sz="1400" dirty="0" smtClean="0">
+                <a:solidFill>
+                  <a:srgbClr val="2007DD"/>
+                </a:solidFill>
+              </a:endParaRPr>
+            </a:p>
+          </p:txBody>
+        </p:sp>
+      </p:grpSp>
+      <p:sp>
+        <p:nvSpPr>
+          <p:cNvPr id="17" name="TextBox 12"/>
+          <p:cNvSpPr txBox="1"/>
+          <p:nvPr/>
+        </p:nvSpPr>
+        <p:spPr>
+          <a:xfrm>
+            <a:off x="4196633" y="5641240"/>
+            <a:ext cx="1442292" cy="646331"/>
+          </a:xfrm>
+          <a:prstGeom prst="rect">
+            <a:avLst/>
+          </a:prstGeom>
+          <a:noFill/>
+          <a:ln>
+            <a:noFill/>
+          </a:ln>
+        </p:spPr>
+        <p:txBody>
+          <a:bodyPr wrap="square" rtlCol="0">
+            <a:spAutoFit/>
+          </a:bodyPr>
+          <a:lstStyle/>
+          <a:p>
+            <a:r>
+              <a:rPr lang="en-SG" sz="1200" dirty="0" smtClean="0"/>
+              <a:t>School </a:t>
+            </a:r>
+            <a:r>
+              <a:rPr lang="en-SG" sz="1200" dirty="0" smtClean="0"/>
+              <a:t>displayed</a:t>
+            </a:r>
+          </a:p>
+          <a:p>
+            <a:r>
+              <a:rPr lang="en-SG" sz="1200" dirty="0" smtClean="0"/>
+              <a:t>CS2103 finals </a:t>
+            </a:r>
+            <a:r>
+              <a:rPr lang="en-SG" sz="1200" dirty="0" smtClean="0"/>
+              <a:t>edited</a:t>
+            </a:r>
+          </a:p>
+          <a:p>
+            <a:r>
+              <a:rPr lang="en-SG" sz="1200" dirty="0" smtClean="0"/>
+              <a:t>Day displayed</a:t>
+            </a:r>
+            <a:endParaRPr lang="en-SG" sz="1200" dirty="0" smtClean="0"/>
+          </a:p>
+        </p:txBody>
+      </p:sp>
+    </p:spTree>
+    <p:extLst>
+      <p:ext uri="{BB962C8B-B14F-4D97-AF65-F5344CB8AC3E}">
+        <p14:creationId xmlns:p14="http://schemas.microsoft.com/office/powerpoint/2010/main" val="4257707094"/>
+      </p:ext>
+    </p:extLst>
+  </p:cSld>
+  <p:clrMapOvr>
+    <a:masterClrMapping/>
+  </p:clrMapOvr>
+</p:sld>
+</file>
+
+<file path=ppt/slides/slide15.xml><?xml version="1.0" encoding="utf-8"?>
 <p:sld xmlns:a="http://schemas.openxmlformats.org/drawingml/2006/main" xmlns:r="http://schemas.openxmlformats.org/officeDocument/2006/relationships" xmlns:p="http://schemas.openxmlformats.org/presentationml/2006/main">
   <p:cSld>
     <p:spTree>
@@ -6628,15 +7558,7 @@
                     <a:srgbClr val="2007DD"/>
                   </a:solidFill>
                 </a:rPr>
-                <a:t>Do</a:t>
-              </a:r>
-              <a:r>
-                <a:rPr lang="en-SG" sz="1400" dirty="0" smtClean="0">
-                  <a:solidFill>
-                    <a:srgbClr val="2007DD"/>
-                  </a:solidFill>
-                </a:rPr>
-                <a:t> </a:t>
+                <a:t>Do </a:t>
               </a:r>
             </a:p>
             <a:p>
@@ -6911,7 +7833,7 @@
 </p:sld>
 </file>
 
-<file path=ppt/slides/slide14.xml><?xml version="1.0" encoding="utf-8"?>
+<file path=ppt/slides/slide16.xml><?xml version="1.0" encoding="utf-8"?>
 <p:sld xmlns:a="http://schemas.openxmlformats.org/drawingml/2006/main" xmlns:r="http://schemas.openxmlformats.org/officeDocument/2006/relationships" xmlns:p="http://schemas.openxmlformats.org/presentationml/2006/main">
   <p:cSld>
     <p:spTree>
@@ -7086,21 +8008,8 @@
                     <a:srgbClr val="2007DD"/>
                   </a:solidFill>
                 </a:rPr>
-                <a:t>Do </a:t>
-              </a:r>
-              <a:r>
-                <a:rPr lang="en-SG" sz="1400" dirty="0" smtClean="0">
-                  <a:solidFill>
-                    <a:srgbClr val="2007DD"/>
-                  </a:solidFill>
-                </a:rPr>
-                <a:t>Homework</a:t>
-              </a:r>
-              <a:endParaRPr lang="en-SG" sz="1400" dirty="0" smtClean="0">
-                <a:solidFill>
-                  <a:srgbClr val="2007DD"/>
-                </a:solidFill>
-              </a:endParaRPr>
+                <a:t>Do Homework</a:t>
+              </a:r>
             </a:p>
           </p:txBody>
         </p:sp>
@@ -7183,15 +8092,7 @@
                     <a:srgbClr val="2007DD"/>
                   </a:solidFill>
                 </a:rPr>
-                <a:t>[8am-1015am</a:t>
-              </a:r>
-              <a:r>
-                <a:rPr lang="en-SG" sz="1400" dirty="0" smtClean="0">
-                  <a:solidFill>
-                    <a:srgbClr val="2007DD"/>
-                  </a:solidFill>
-                </a:rPr>
-                <a:t>]</a:t>
+                <a:t>[8am-1015am]</a:t>
               </a:r>
               <a:r>
                 <a:rPr lang="en-SG" sz="1400" dirty="0">
@@ -7335,21 +8236,13 @@
             <a:p>
               <a:r>
                 <a:rPr lang="en-SG" sz="1200" dirty="0" smtClean="0"/>
-                <a:t>School </a:t>
-              </a:r>
+                <a:t>School displayed</a:t>
+              </a:r>
+            </a:p>
+            <a:p>
               <a:r>
                 <a:rPr lang="en-SG" sz="1200" dirty="0" smtClean="0"/>
-                <a:t>displayed</a:t>
-              </a:r>
-            </a:p>
-            <a:p>
-              <a:r>
-                <a:rPr lang="en-SG" sz="1200" dirty="0" smtClean="0"/>
-                <a:t>CS2103 finals </a:t>
-              </a:r>
-              <a:r>
-                <a:rPr lang="en-SG" sz="1200" dirty="0" smtClean="0"/>
-                <a:t>edited</a:t>
+                <a:t>CS2103 finals edited</a:t>
               </a:r>
             </a:p>
             <a:p>
@@ -7357,7 +8250,6 @@
                 <a:rPr lang="en-SG" sz="1200" dirty="0" smtClean="0"/>
                 <a:t>Undo: CS2103 finals edited</a:t>
               </a:r>
-              <a:endParaRPr lang="en-SG" sz="1200" dirty="0" smtClean="0"/>
             </a:p>
           </p:txBody>
         </p:sp>
@@ -7375,7 +8267,7 @@
 </p:sld>
 </file>
 
-<file path=ppt/slides/slide15.xml><?xml version="1.0" encoding="utf-8"?>
+<file path=ppt/slides/slide17.xml><?xml version="1.0" encoding="utf-8"?>
 <p:sld xmlns:a="http://schemas.openxmlformats.org/drawingml/2006/main" xmlns:r="http://schemas.openxmlformats.org/officeDocument/2006/relationships" xmlns:p="http://schemas.openxmlformats.org/presentationml/2006/main">
   <p:cSld>
     <p:spTree>
@@ -7554,11 +8446,6 @@
                 </a:rPr>
                 <a:t>Do</a:t>
               </a:r>
-              <a:endParaRPr lang="en-SG" sz="1400" dirty="0" smtClean="0">
-                <a:solidFill>
-                  <a:srgbClr val="2007DD"/>
-                </a:solidFill>
-              </a:endParaRPr>
             </a:p>
           </p:txBody>
         </p:sp>
@@ -7641,15 +8528,7 @@
                     <a:srgbClr val="2007DD"/>
                   </a:solidFill>
                 </a:rPr>
-                <a:t>[8am-1015am</a:t>
-              </a:r>
-              <a:r>
-                <a:rPr lang="en-SG" sz="1400" dirty="0" smtClean="0">
-                  <a:solidFill>
-                    <a:srgbClr val="2007DD"/>
-                  </a:solidFill>
-                </a:rPr>
-                <a:t>]</a:t>
+                <a:t>[8am-1015am]</a:t>
               </a:r>
               <a:r>
                 <a:rPr lang="en-SG" sz="1400" dirty="0">
@@ -7799,15 +8678,7 @@
             <a:p>
               <a:r>
                 <a:rPr lang="en-SG" sz="1200" dirty="0" smtClean="0"/>
-                <a:t>CS2103 </a:t>
-              </a:r>
-              <a:r>
-                <a:rPr lang="en-SG" sz="1200" dirty="0" smtClean="0"/>
-                <a:t>finals </a:t>
-              </a:r>
-              <a:r>
-                <a:rPr lang="en-SG" sz="1200" dirty="0" smtClean="0"/>
-                <a:t>edited</a:t>
+                <a:t>CS2103 finals edited</a:t>
               </a:r>
             </a:p>
             <a:p>
@@ -7815,7 +8686,6 @@
                 <a:rPr lang="en-SG" sz="1200" dirty="0" smtClean="0"/>
                 <a:t>Undo: CS2103 finals edited</a:t>
               </a:r>
-              <a:endParaRPr lang="en-SG" sz="1200" dirty="0" smtClean="0"/>
             </a:p>
           </p:txBody>
         </p:sp>
@@ -7833,7 +8703,7 @@
 </p:sld>
 </file>
 
-<file path=ppt/slides/slide16.xml><?xml version="1.0" encoding="utf-8"?>
+<file path=ppt/slides/slide18.xml><?xml version="1.0" encoding="utf-8"?>
 <p:sld xmlns:a="http://schemas.openxmlformats.org/drawingml/2006/main" xmlns:r="http://schemas.openxmlformats.org/officeDocument/2006/relationships" xmlns:p="http://schemas.openxmlformats.org/presentationml/2006/main">
   <p:cSld>
     <p:spTree>
@@ -8008,21 +8878,8 @@
                     <a:srgbClr val="2007DD"/>
                   </a:solidFill>
                 </a:rPr>
-                <a:t>Do </a:t>
-              </a:r>
-              <a:r>
-                <a:rPr lang="en-SG" sz="1400" dirty="0" smtClean="0">
-                  <a:solidFill>
-                    <a:srgbClr val="2007DD"/>
-                  </a:solidFill>
-                </a:rPr>
-                <a:t>Homework</a:t>
-              </a:r>
-              <a:endParaRPr lang="en-SG" sz="1400" dirty="0" smtClean="0">
-                <a:solidFill>
-                  <a:srgbClr val="2007DD"/>
-                </a:solidFill>
-              </a:endParaRPr>
+                <a:t>Do Homework</a:t>
+              </a:r>
             </a:p>
           </p:txBody>
         </p:sp>
@@ -8105,15 +8962,7 @@
                     <a:srgbClr val="2007DD"/>
                   </a:solidFill>
                 </a:rPr>
-                <a:t>[9am-10am</a:t>
-              </a:r>
-              <a:r>
-                <a:rPr lang="en-SG" sz="1400" dirty="0" smtClean="0">
-                  <a:solidFill>
-                    <a:srgbClr val="2007DD"/>
-                  </a:solidFill>
-                </a:rPr>
-                <a:t>]</a:t>
+                <a:t>[9am-10am]</a:t>
               </a:r>
               <a:r>
                 <a:rPr lang="en-SG" sz="1400" dirty="0">
@@ -8257,15 +9106,7 @@
             <a:p>
               <a:r>
                 <a:rPr lang="en-SG" sz="1200" dirty="0" smtClean="0"/>
-                <a:t>CS2103 </a:t>
-              </a:r>
-              <a:r>
-                <a:rPr lang="en-SG" sz="1200" dirty="0" smtClean="0"/>
-                <a:t>finals </a:t>
-              </a:r>
-              <a:r>
-                <a:rPr lang="en-SG" sz="1200" dirty="0" smtClean="0"/>
-                <a:t>edited</a:t>
+                <a:t>CS2103 finals edited</a:t>
               </a:r>
             </a:p>
             <a:p>
@@ -8305,7 +9146,7 @@
 </p:sld>
 </file>
 
-<file path=ppt/slides/slide17.xml><?xml version="1.0" encoding="utf-8"?>
+<file path=ppt/slides/slide19.xml><?xml version="1.0" encoding="utf-8"?>
 <p:sld xmlns:a="http://schemas.openxmlformats.org/drawingml/2006/main" xmlns:r="http://schemas.openxmlformats.org/officeDocument/2006/relationships" xmlns:p="http://schemas.openxmlformats.org/presentationml/2006/main">
   <p:cSld>
     <p:spTree>
@@ -8342,25 +9183,6 @@
               <a:t>HELP</a:t>
             </a:r>
             <a:endParaRPr lang="en-SG" dirty="0"/>
-          </a:p>
-        </p:txBody>
-      </p:sp>
-      <p:sp>
-        <p:nvSpPr>
-          <p:cNvPr id="3" name="Content Placeholder 2"/>
-          <p:cNvSpPr>
-            <a:spLocks noGrp="1"/>
-          </p:cNvSpPr>
-          <p:nvPr>
-            <p:ph idx="1"/>
-          </p:nvPr>
-        </p:nvSpPr>
-        <p:spPr/>
-        <p:txBody>
-          <a:bodyPr/>
-          <a:lstStyle/>
-          <a:p>
-            <a:endParaRPr lang="en-SG"/>
           </a:p>
         </p:txBody>
       </p:sp>
@@ -8741,6 +9563,74 @@
     <p:extLst>
       <p:ext uri="{BB962C8B-B14F-4D97-AF65-F5344CB8AC3E}">
         <p14:creationId xmlns:p14="http://schemas.microsoft.com/office/powerpoint/2010/main" val="3965354207"/>
+      </p:ext>
+    </p:extLst>
+  </p:cSld>
+  <p:clrMapOvr>
+    <a:masterClrMapping/>
+  </p:clrMapOvr>
+</p:sld>
+</file>
+
+<file path=ppt/slides/slide20.xml><?xml version="1.0" encoding="utf-8"?>
+<p:sld xmlns:a="http://schemas.openxmlformats.org/drawingml/2006/main" xmlns:r="http://schemas.openxmlformats.org/officeDocument/2006/relationships" xmlns:p="http://schemas.openxmlformats.org/presentationml/2006/main">
+  <p:cSld>
+    <p:spTree>
+      <p:nvGrpSpPr>
+        <p:cNvPr id="1" name=""/>
+        <p:cNvGrpSpPr/>
+        <p:nvPr/>
+      </p:nvGrpSpPr>
+      <p:grpSpPr>
+        <a:xfrm>
+          <a:off x="0" y="0"/>
+          <a:ext cx="0" cy="0"/>
+          <a:chOff x="0" y="0"/>
+          <a:chExt cx="0" cy="0"/>
+        </a:xfrm>
+      </p:grpSpPr>
+      <p:sp>
+        <p:nvSpPr>
+          <p:cNvPr id="2" name="Title 1"/>
+          <p:cNvSpPr>
+            <a:spLocks noGrp="1"/>
+          </p:cNvSpPr>
+          <p:nvPr>
+            <p:ph type="title"/>
+          </p:nvPr>
+        </p:nvSpPr>
+        <p:spPr/>
+        <p:txBody>
+          <a:bodyPr/>
+          <a:lstStyle/>
+          <a:p>
+            <a:endParaRPr lang="en-SG"/>
+          </a:p>
+        </p:txBody>
+      </p:sp>
+      <p:sp>
+        <p:nvSpPr>
+          <p:cNvPr id="3" name="Content Placeholder 2"/>
+          <p:cNvSpPr>
+            <a:spLocks noGrp="1"/>
+          </p:cNvSpPr>
+          <p:nvPr>
+            <p:ph idx="1"/>
+          </p:nvPr>
+        </p:nvSpPr>
+        <p:spPr/>
+        <p:txBody>
+          <a:bodyPr/>
+          <a:lstStyle/>
+          <a:p>
+            <a:endParaRPr lang="en-SG"/>
+          </a:p>
+        </p:txBody>
+      </p:sp>
+    </p:spTree>
+    <p:extLst>
+      <p:ext uri="{BB962C8B-B14F-4D97-AF65-F5344CB8AC3E}">
+        <p14:creationId xmlns:p14="http://schemas.microsoft.com/office/powerpoint/2010/main" val="1630785408"/>
       </p:ext>
     </p:extLst>
   </p:cSld>
@@ -10334,7 +11224,11 @@
               </a:r>
               <a:r>
                 <a:rPr lang="en-SG" sz="1200" dirty="0" smtClean="0"/>
-                <a:t>elete Homework</a:t>
+                <a:t>elete Do </a:t>
+              </a:r>
+              <a:r>
+                <a:rPr lang="en-SG" sz="1200" dirty="0" smtClean="0"/>
+                <a:t>Homework</a:t>
               </a:r>
               <a:endParaRPr lang="en-SG" sz="1200" dirty="0"/>
             </a:p>

</xml_diff>